<commit_message>
Update three video lectures to 2023.
</commit_message>
<xml_diff>
--- a/lectures3/Pythonlearn-08-Lists.pptx
+++ b/lectures3/Pythonlearn-08-Lists.pptx
@@ -7201,7 +7201,7 @@
                 <a:cs typeface="Courier"/>
                 <a:sym typeface="Courier New"/>
               </a:rPr>
-              <a:t>range</a:t>
+              <a:t>list(range</a:t>
             </a:r>
             <a:r>
               <a:rPr lang="en-US" sz="2400" b="1" i="0" u="none" strike="noStrike" cap="none" dirty="0">
@@ -7240,7 +7240,7 @@
               <a:t>(</a:t>
             </a:r>
             <a:r>
-              <a:rPr lang="en-US" sz="2400" b="1" i="0" u="none" strike="noStrike" cap="none" dirty="0">
+              <a:rPr lang="en-US" sz="2400" b="1" i="0" u="none" strike="noStrike" cap="none">
                 <a:solidFill>
                   <a:srgbClr val="00FF00"/>
                 </a:solidFill>
@@ -7252,19 +7252,19 @@
               <a:t>friends</a:t>
             </a:r>
             <a:r>
-              <a:rPr lang="en-US" sz="2400" b="1" i="0" u="none" strike="noStrike" cap="none" dirty="0">
-                <a:solidFill>
-                  <a:schemeClr val="lt1"/>
-                </a:solidFill>
-                <a:latin typeface="Courier"/>
-                <a:ea typeface="Courier"/>
-                <a:cs typeface="Courier"/>
-                <a:sym typeface="Courier New"/>
-              </a:rPr>
-              <a:t>))</a:t>
-            </a:r>
-            <a:r>
-              <a:rPr lang="en-US" sz="2400" b="1" dirty="0">
+              <a:rPr lang="en-US" sz="2400" b="1" i="0" u="none" strike="noStrike" cap="none">
+                <a:solidFill>
+                  <a:schemeClr val="lt1"/>
+                </a:solidFill>
+                <a:latin typeface="Courier"/>
+                <a:ea typeface="Courier"/>
+                <a:cs typeface="Courier"/>
+                <a:sym typeface="Courier New"/>
+              </a:rPr>
+              <a:t>)))</a:t>
+            </a:r>
+            <a:r>
+              <a:rPr lang="en-US" sz="2400" b="1">
                 <a:solidFill>
                   <a:srgbClr val="FFFF00"/>
                 </a:solidFill>

</xml_diff>